<commit_message>
Update 4. Messaging Passing for Node Classification.pptx
</commit_message>
<xml_diff>
--- a/4. Messaging Passing for Node Classification.pptx
+++ b/4. Messaging Passing for Node Classification.pptx
@@ -10371,11 +10371,7 @@
           <a:p>
             <a:r>
               <a:rPr lang="en-US" sz="4400" b="1" dirty="0"/>
-              <a:t>Messaging Passing for Node </a:t>
-            </a:r>
-            <a:r>
-              <a:rPr lang="en-US" sz="4400" b="1" dirty="0" err="1"/>
-              <a:t>Classifcation</a:t>
+              <a:t>Messaging Passing for Node Classification</a:t>
             </a:r>
             <a:br>
               <a:rPr lang="en-US" sz="4400" b="1" dirty="0"/>
@@ -20618,8 +20614,8 @@
           </a:p>
         </p:txBody>
       </p:sp>
-      <mc:AlternateContent xmlns:mc="http://schemas.openxmlformats.org/markup-compatibility/2006">
-        <mc:Choice xmlns:a14="http://schemas.microsoft.com/office/drawing/2010/main" Requires="a14">
+      <mc:AlternateContent xmlns:mc="http://schemas.openxmlformats.org/markup-compatibility/2006" xmlns:a14="http://schemas.microsoft.com/office/drawing/2010/main">
+        <mc:Choice Requires="a14">
           <p:sp>
             <p:nvSpPr>
               <p:cNvPr id="3" name="Content Placeholder 2">
@@ -21119,7 +21115,7 @@
             </p:txBody>
           </p:sp>
         </mc:Choice>
-        <mc:Fallback>
+        <mc:Fallback xmlns="">
           <p:sp>
             <p:nvSpPr>
               <p:cNvPr id="3" name="Content Placeholder 2">
@@ -21358,8 +21354,8 @@
           </a:p>
         </p:txBody>
       </p:sp>
-      <mc:AlternateContent xmlns:mc="http://schemas.openxmlformats.org/markup-compatibility/2006">
-        <mc:Choice xmlns:a14="http://schemas.microsoft.com/office/drawing/2010/main" Requires="a14">
+      <mc:AlternateContent xmlns:mc="http://schemas.openxmlformats.org/markup-compatibility/2006" xmlns:a14="http://schemas.microsoft.com/office/drawing/2010/main">
+        <mc:Choice Requires="a14">
           <p:sp>
             <p:nvSpPr>
               <p:cNvPr id="3" name="Content Placeholder 2">
@@ -21740,7 +21736,7 @@
             </p:txBody>
           </p:sp>
         </mc:Choice>
-        <mc:Fallback>
+        <mc:Fallback xmlns="">
           <p:sp>
             <p:nvSpPr>
               <p:cNvPr id="3" name="Content Placeholder 2">
@@ -21878,8 +21874,8 @@
           </a:prstGeom>
         </p:spPr>
       </p:pic>
-      <mc:AlternateContent xmlns:mc="http://schemas.openxmlformats.org/markup-compatibility/2006">
-        <mc:Choice xmlns:a14="http://schemas.microsoft.com/office/drawing/2010/main" Requires="a14">
+      <mc:AlternateContent xmlns:mc="http://schemas.openxmlformats.org/markup-compatibility/2006" xmlns:a14="http://schemas.microsoft.com/office/drawing/2010/main">
+        <mc:Choice Requires="a14">
           <p:sp>
             <p:nvSpPr>
               <p:cNvPr id="12" name="TextBox 11">
@@ -21951,7 +21947,7 @@
             </p:txBody>
           </p:sp>
         </mc:Choice>
-        <mc:Fallback>
+        <mc:Fallback xmlns="">
           <p:sp>
             <p:nvSpPr>
               <p:cNvPr id="12" name="TextBox 11">
@@ -21996,8 +21992,8 @@
           </p:sp>
         </mc:Fallback>
       </mc:AlternateContent>
-      <mc:AlternateContent xmlns:mc="http://schemas.openxmlformats.org/markup-compatibility/2006">
-        <mc:Choice xmlns:a14="http://schemas.microsoft.com/office/drawing/2010/main" Requires="a14">
+      <mc:AlternateContent xmlns:mc="http://schemas.openxmlformats.org/markup-compatibility/2006" xmlns:a14="http://schemas.microsoft.com/office/drawing/2010/main">
+        <mc:Choice Requires="a14">
           <p:sp>
             <p:nvSpPr>
               <p:cNvPr id="14" name="TextBox 13">
@@ -22071,7 +22067,7 @@
             </p:txBody>
           </p:sp>
         </mc:Choice>
-        <mc:Fallback>
+        <mc:Fallback xmlns="">
           <p:sp>
             <p:nvSpPr>
               <p:cNvPr id="14" name="TextBox 13">
@@ -24916,8 +24912,8 @@
           </a:fontRef>
         </p:style>
       </p:cxnSp>
-      <mc:AlternateContent xmlns:mc="http://schemas.openxmlformats.org/markup-compatibility/2006">
-        <mc:Choice xmlns:a14="http://schemas.microsoft.com/office/drawing/2010/main" Requires="a14">
+      <mc:AlternateContent xmlns:mc="http://schemas.openxmlformats.org/markup-compatibility/2006" xmlns:a14="http://schemas.microsoft.com/office/drawing/2010/main">
+        <mc:Choice Requires="a14">
           <p:sp>
             <p:nvSpPr>
               <p:cNvPr id="40" name="TextBox 39">
@@ -25390,7 +25386,7 @@
             </p:txBody>
           </p:sp>
         </mc:Choice>
-        <mc:Fallback>
+        <mc:Fallback xmlns="">
           <p:sp>
             <p:nvSpPr>
               <p:cNvPr id="40" name="TextBox 39">
@@ -25435,8 +25431,8 @@
           </p:sp>
         </mc:Fallback>
       </mc:AlternateContent>
-      <mc:AlternateContent xmlns:mc="http://schemas.openxmlformats.org/markup-compatibility/2006">
-        <mc:Choice xmlns:a14="http://schemas.microsoft.com/office/drawing/2010/main" Requires="a14">
+      <mc:AlternateContent xmlns:mc="http://schemas.openxmlformats.org/markup-compatibility/2006" xmlns:a14="http://schemas.microsoft.com/office/drawing/2010/main">
+        <mc:Choice Requires="a14">
           <p:sp>
             <p:nvSpPr>
               <p:cNvPr id="42" name="TextBox 41">
@@ -25862,7 +25858,7 @@
             </p:txBody>
           </p:sp>
         </mc:Choice>
-        <mc:Fallback>
+        <mc:Fallback xmlns="">
           <p:sp>
             <p:nvSpPr>
               <p:cNvPr id="42" name="TextBox 41">
@@ -29924,8 +29920,8 @@
           </a:p>
         </p:txBody>
       </p:sp>
-      <mc:AlternateContent xmlns:mc="http://schemas.openxmlformats.org/markup-compatibility/2006">
-        <mc:Choice xmlns:a14="http://schemas.microsoft.com/office/drawing/2010/main" Requires="a14">
+      <mc:AlternateContent xmlns:mc="http://schemas.openxmlformats.org/markup-compatibility/2006" xmlns:a14="http://schemas.microsoft.com/office/drawing/2010/main">
+        <mc:Choice Requires="a14">
           <p:sp>
             <p:nvSpPr>
               <p:cNvPr id="7" name="TextBox 6">
@@ -30251,7 +30247,7 @@
             </p:txBody>
           </p:sp>
         </mc:Choice>
-        <mc:Fallback>
+        <mc:Fallback xmlns="">
           <p:sp>
             <p:nvSpPr>
               <p:cNvPr id="7" name="TextBox 6">
@@ -30296,8 +30292,8 @@
           </p:sp>
         </mc:Fallback>
       </mc:AlternateContent>
-      <mc:AlternateContent xmlns:mc="http://schemas.openxmlformats.org/markup-compatibility/2006">
-        <mc:Choice xmlns:a14="http://schemas.microsoft.com/office/drawing/2010/main" Requires="a14">
+      <mc:AlternateContent xmlns:mc="http://schemas.openxmlformats.org/markup-compatibility/2006" xmlns:a14="http://schemas.microsoft.com/office/drawing/2010/main">
+        <mc:Choice Requires="a14">
           <p:sp>
             <p:nvSpPr>
               <p:cNvPr id="13" name="TextBox 12">
@@ -30541,7 +30537,7 @@
             </p:txBody>
           </p:sp>
         </mc:Choice>
-        <mc:Fallback>
+        <mc:Fallback xmlns="">
           <p:sp>
             <p:nvSpPr>
               <p:cNvPr id="13" name="TextBox 12">
@@ -30586,8 +30582,8 @@
           </p:sp>
         </mc:Fallback>
       </mc:AlternateContent>
-      <mc:AlternateContent xmlns:mc="http://schemas.openxmlformats.org/markup-compatibility/2006">
-        <mc:Choice xmlns:a14="http://schemas.microsoft.com/office/drawing/2010/main" Requires="a14">
+      <mc:AlternateContent xmlns:mc="http://schemas.openxmlformats.org/markup-compatibility/2006" xmlns:a14="http://schemas.microsoft.com/office/drawing/2010/main">
+        <mc:Choice Requires="a14">
           <p:sp>
             <p:nvSpPr>
               <p:cNvPr id="15" name="TextBox 14">
@@ -30868,7 +30864,7 @@
             </p:txBody>
           </p:sp>
         </mc:Choice>
-        <mc:Fallback>
+        <mc:Fallback xmlns="">
           <p:sp>
             <p:nvSpPr>
               <p:cNvPr id="15" name="TextBox 14">
@@ -31200,7 +31196,7 @@
     <p:bldLst>
       <p:bldP spid="13" grpId="0"/>
       <p:bldP spid="15" grpId="0"/>
-      <p:bldP spid="19" grpId="0"/>
+      <p:bldP spid="19" grpId="0" animBg="1"/>
     </p:bldLst>
   </p:timing>
 </p:sld>
@@ -34576,8 +34572,8 @@
           </a:p>
         </p:txBody>
       </p:sp>
-      <mc:AlternateContent xmlns:mc="http://schemas.openxmlformats.org/markup-compatibility/2006">
-        <mc:Choice xmlns:a14="http://schemas.microsoft.com/office/drawing/2010/main" Requires="a14">
+      <mc:AlternateContent xmlns:mc="http://schemas.openxmlformats.org/markup-compatibility/2006" xmlns:a14="http://schemas.microsoft.com/office/drawing/2010/main">
+        <mc:Choice Requires="a14">
           <p:sp>
             <p:nvSpPr>
               <p:cNvPr id="13" name="TextBox 12">
@@ -35010,7 +35006,7 @@
             </p:txBody>
           </p:sp>
         </mc:Choice>
-        <mc:Fallback>
+        <mc:Fallback xmlns="">
           <p:sp>
             <p:nvSpPr>
               <p:cNvPr id="13" name="TextBox 12">
@@ -35296,7 +35292,7 @@
     </p:tnLst>
     <p:bldLst>
       <p:bldP spid="13" grpId="0"/>
-      <p:bldP spid="19" grpId="0"/>
+      <p:bldP spid="19" grpId="0" animBg="1"/>
     </p:bldLst>
   </p:timing>
 </p:sld>

</xml_diff>